<commit_message>
Two out of seven down, one to go
</commit_message>
<xml_diff>
--- a/outputs/Investigating the alcohol inequality paradox V5.pptx
+++ b/outputs/Investigating the alcohol inequality paradox V5.pptx
@@ -338,6 +338,170 @@
 </p1510:revInfo>
 </file>
 
+<file path=ppt/changesInfos/changesInfo1.xml><?xml version="1.0" encoding="utf-8"?>
+<pc:chgInfo xmlns:a="http://schemas.openxmlformats.org/drawingml/2006/main" xmlns:r="http://schemas.openxmlformats.org/officeDocument/2006/relationships" xmlns:ac="http://schemas.microsoft.com/office/drawing/2013/main/command" xmlns:pc="http://schemas.microsoft.com/office/powerpoint/2013/main/command">
+  <pc:docChgLst>
+    <pc:chgData name="Rich Tyler" userId="6f91f1d9d288ee24" providerId="LiveId" clId="{3F058A5F-5980-4B63-9AC7-0D5A06D52989}"/>
+    <pc:docChg chg="undo custSel modSld">
+      <pc:chgData name="Rich Tyler" userId="6f91f1d9d288ee24" providerId="LiveId" clId="{3F058A5F-5980-4B63-9AC7-0D5A06D52989}" dt="2023-03-03T15:17:02.399" v="100" actId="14100"/>
+      <pc:docMkLst>
+        <pc:docMk/>
+      </pc:docMkLst>
+      <pc:sldChg chg="modSp mod">
+        <pc:chgData name="Rich Tyler" userId="6f91f1d9d288ee24" providerId="LiveId" clId="{3F058A5F-5980-4B63-9AC7-0D5A06D52989}" dt="2023-03-03T15:12:25.304" v="0" actId="403"/>
+        <pc:sldMkLst>
+          <pc:docMk/>
+          <pc:sldMk cId="433591167" sldId="259"/>
+        </pc:sldMkLst>
+        <pc:spChg chg="mod">
+          <ac:chgData name="Rich Tyler" userId="6f91f1d9d288ee24" providerId="LiveId" clId="{3F058A5F-5980-4B63-9AC7-0D5A06D52989}" dt="2023-03-03T15:12:25.304" v="0" actId="403"/>
+          <ac:spMkLst>
+            <pc:docMk/>
+            <pc:sldMk cId="433591167" sldId="259"/>
+            <ac:spMk id="3" creationId="{BB20F553-E3C0-ABB8-0F37-2F0392154B4B}"/>
+          </ac:spMkLst>
+        </pc:spChg>
+      </pc:sldChg>
+      <pc:sldChg chg="delSp modSp mod">
+        <pc:chgData name="Rich Tyler" userId="6f91f1d9d288ee24" providerId="LiveId" clId="{3F058A5F-5980-4B63-9AC7-0D5A06D52989}" dt="2023-03-03T15:17:02.399" v="100" actId="14100"/>
+        <pc:sldMkLst>
+          <pc:docMk/>
+          <pc:sldMk cId="1554654902" sldId="264"/>
+        </pc:sldMkLst>
+        <pc:spChg chg="mod">
+          <ac:chgData name="Rich Tyler" userId="6f91f1d9d288ee24" providerId="LiveId" clId="{3F058A5F-5980-4B63-9AC7-0D5A06D52989}" dt="2023-03-03T15:17:02.399" v="100" actId="14100"/>
+          <ac:spMkLst>
+            <pc:docMk/>
+            <pc:sldMk cId="1554654902" sldId="264"/>
+            <ac:spMk id="6" creationId="{A1BCB70C-EFFA-E288-9B9D-78DE836A2F88}"/>
+          </ac:spMkLst>
+        </pc:spChg>
+        <pc:spChg chg="del mod">
+          <ac:chgData name="Rich Tyler" userId="6f91f1d9d288ee24" providerId="LiveId" clId="{3F058A5F-5980-4B63-9AC7-0D5A06D52989}" dt="2023-03-03T15:16:56.947" v="99" actId="478"/>
+          <ac:spMkLst>
+            <pc:docMk/>
+            <pc:sldMk cId="1554654902" sldId="264"/>
+            <ac:spMk id="7" creationId="{C919DF72-385D-9569-14AE-E6AEA74BD526}"/>
+          </ac:spMkLst>
+        </pc:spChg>
+        <pc:spChg chg="mod">
+          <ac:chgData name="Rich Tyler" userId="6f91f1d9d288ee24" providerId="LiveId" clId="{3F058A5F-5980-4B63-9AC7-0D5A06D52989}" dt="2023-03-03T15:12:34.443" v="2" actId="403"/>
+          <ac:spMkLst>
+            <pc:docMk/>
+            <pc:sldMk cId="1554654902" sldId="264"/>
+            <ac:spMk id="8" creationId="{3CDA8664-1109-8A94-3FAD-8BD8392BDB99}"/>
+          </ac:spMkLst>
+        </pc:spChg>
+        <pc:spChg chg="mod">
+          <ac:chgData name="Rich Tyler" userId="6f91f1d9d288ee24" providerId="LiveId" clId="{3F058A5F-5980-4B63-9AC7-0D5A06D52989}" dt="2023-03-03T15:12:54.148" v="8" actId="1076"/>
+          <ac:spMkLst>
+            <pc:docMk/>
+            <pc:sldMk cId="1554654902" sldId="264"/>
+            <ac:spMk id="9" creationId="{AEFB2C14-5882-677D-04F4-DBC18C489D0C}"/>
+          </ac:spMkLst>
+        </pc:spChg>
+        <pc:spChg chg="mod">
+          <ac:chgData name="Rich Tyler" userId="6f91f1d9d288ee24" providerId="LiveId" clId="{3F058A5F-5980-4B63-9AC7-0D5A06D52989}" dt="2023-03-03T15:16:32.224" v="96" actId="403"/>
+          <ac:spMkLst>
+            <pc:docMk/>
+            <pc:sldMk cId="1554654902" sldId="264"/>
+            <ac:spMk id="10" creationId="{48AB47BD-EF00-6ABC-A6B3-03B0758B0091}"/>
+          </ac:spMkLst>
+        </pc:spChg>
+        <pc:spChg chg="mod">
+          <ac:chgData name="Rich Tyler" userId="6f91f1d9d288ee24" providerId="LiveId" clId="{3F058A5F-5980-4B63-9AC7-0D5A06D52989}" dt="2023-03-03T15:16:41.874" v="97" actId="1076"/>
+          <ac:spMkLst>
+            <pc:docMk/>
+            <pc:sldMk cId="1554654902" sldId="264"/>
+            <ac:spMk id="11" creationId="{745B5497-3FCC-D91B-D601-BF6A89E5D3E4}"/>
+          </ac:spMkLst>
+        </pc:spChg>
+        <pc:spChg chg="mod">
+          <ac:chgData name="Rich Tyler" userId="6f91f1d9d288ee24" providerId="LiveId" clId="{3F058A5F-5980-4B63-9AC7-0D5A06D52989}" dt="2023-03-03T15:16:48.979" v="98" actId="1076"/>
+          <ac:spMkLst>
+            <pc:docMk/>
+            <pc:sldMk cId="1554654902" sldId="264"/>
+            <ac:spMk id="12" creationId="{A1EA3E70-676C-5817-2C66-5A79C8D15784}"/>
+          </ac:spMkLst>
+        </pc:spChg>
+        <pc:spChg chg="mod">
+          <ac:chgData name="Rich Tyler" userId="6f91f1d9d288ee24" providerId="LiveId" clId="{3F058A5F-5980-4B63-9AC7-0D5A06D52989}" dt="2023-03-03T15:16:22.284" v="94" actId="6549"/>
+          <ac:spMkLst>
+            <pc:docMk/>
+            <pc:sldMk cId="1554654902" sldId="264"/>
+            <ac:spMk id="13" creationId="{F6D2CFBA-0040-275F-3430-1313C556CC5E}"/>
+          </ac:spMkLst>
+        </pc:spChg>
+        <pc:spChg chg="mod">
+          <ac:chgData name="Rich Tyler" userId="6f91f1d9d288ee24" providerId="LiveId" clId="{3F058A5F-5980-4B63-9AC7-0D5A06D52989}" dt="2023-03-03T15:16:32.224" v="96" actId="403"/>
+          <ac:spMkLst>
+            <pc:docMk/>
+            <pc:sldMk cId="1554654902" sldId="264"/>
+            <ac:spMk id="14" creationId="{AEAD2C9B-C482-469A-A7BA-A4F8FD7E5A0C}"/>
+          </ac:spMkLst>
+        </pc:spChg>
+        <pc:spChg chg="mod">
+          <ac:chgData name="Rich Tyler" userId="6f91f1d9d288ee24" providerId="LiveId" clId="{3F058A5F-5980-4B63-9AC7-0D5A06D52989}" dt="2023-03-03T15:15:10.413" v="49" actId="1076"/>
+          <ac:spMkLst>
+            <pc:docMk/>
+            <pc:sldMk cId="1554654902" sldId="264"/>
+            <ac:spMk id="15" creationId="{7A3ACB28-470A-6FD9-6ED8-A8337B429915}"/>
+          </ac:spMkLst>
+        </pc:spChg>
+        <pc:spChg chg="mod">
+          <ac:chgData name="Rich Tyler" userId="6f91f1d9d288ee24" providerId="LiveId" clId="{3F058A5F-5980-4B63-9AC7-0D5A06D52989}" dt="2023-03-03T15:16:32.224" v="96" actId="403"/>
+          <ac:spMkLst>
+            <pc:docMk/>
+            <pc:sldMk cId="1554654902" sldId="264"/>
+            <ac:spMk id="16" creationId="{CE628A7D-0C0B-C023-DD12-2BC0E518A605}"/>
+          </ac:spMkLst>
+        </pc:spChg>
+        <pc:spChg chg="mod">
+          <ac:chgData name="Rich Tyler" userId="6f91f1d9d288ee24" providerId="LiveId" clId="{3F058A5F-5980-4B63-9AC7-0D5A06D52989}" dt="2023-03-03T15:15:51.724" v="66" actId="1035"/>
+          <ac:spMkLst>
+            <pc:docMk/>
+            <pc:sldMk cId="1554654902" sldId="264"/>
+            <ac:spMk id="17" creationId="{F56F21F0-1527-66A1-4AA3-CD2EF7E458F2}"/>
+          </ac:spMkLst>
+        </pc:spChg>
+        <pc:spChg chg="mod">
+          <ac:chgData name="Rich Tyler" userId="6f91f1d9d288ee24" providerId="LiveId" clId="{3F058A5F-5980-4B63-9AC7-0D5A06D52989}" dt="2023-03-03T15:16:32.224" v="96" actId="403"/>
+          <ac:spMkLst>
+            <pc:docMk/>
+            <pc:sldMk cId="1554654902" sldId="264"/>
+            <ac:spMk id="18" creationId="{24BE73D2-EDF2-0B3D-520D-FF093EE53B5C}"/>
+          </ac:spMkLst>
+        </pc:spChg>
+        <pc:spChg chg="mod">
+          <ac:chgData name="Rich Tyler" userId="6f91f1d9d288ee24" providerId="LiveId" clId="{3F058A5F-5980-4B63-9AC7-0D5A06D52989}" dt="2023-03-03T15:13:13.167" v="15" actId="14100"/>
+          <ac:spMkLst>
+            <pc:docMk/>
+            <pc:sldMk cId="1554654902" sldId="264"/>
+            <ac:spMk id="19" creationId="{D35F3172-49FC-B532-0D1A-05BA357D579C}"/>
+          </ac:spMkLst>
+        </pc:spChg>
+        <pc:spChg chg="mod">
+          <ac:chgData name="Rich Tyler" userId="6f91f1d9d288ee24" providerId="LiveId" clId="{3F058A5F-5980-4B63-9AC7-0D5A06D52989}" dt="2023-03-03T15:14:56.420" v="46" actId="20577"/>
+          <ac:spMkLst>
+            <pc:docMk/>
+            <pc:sldMk cId="1554654902" sldId="264"/>
+            <ac:spMk id="21" creationId="{D8B424AF-C0FF-51C8-587F-65D844BBA25E}"/>
+          </ac:spMkLst>
+        </pc:spChg>
+        <pc:picChg chg="mod">
+          <ac:chgData name="Rich Tyler" userId="6f91f1d9d288ee24" providerId="LiveId" clId="{3F058A5F-5980-4B63-9AC7-0D5A06D52989}" dt="2023-03-03T15:14:04.573" v="35" actId="14100"/>
+          <ac:picMkLst>
+            <pc:docMk/>
+            <pc:sldMk cId="1554654902" sldId="264"/>
+            <ac:picMk id="20" creationId="{D1C2AAA0-3D2A-5E2D-2D8B-F2E7683B26A8}"/>
+          </ac:picMkLst>
+        </pc:picChg>
+      </pc:sldChg>
+    </pc:docChg>
+  </pc:docChgLst>
+</pc:chgInfo>
+</file>
+
 <file path=ppt/notesMasters/notesMaster1.xml><?xml version="1.0" encoding="utf-8"?>
 <p:notesMaster xmlns:a="http://schemas.openxmlformats.org/drawingml/2006/main" xmlns:r="http://schemas.openxmlformats.org/officeDocument/2006/relationships" xmlns:p="http://schemas.openxmlformats.org/presentationml/2006/main">
   <p:cSld>
@@ -3358,7 +3522,7 @@
           </a:ln>
           <a:extLst>
             <a:ext uri="{C572A759-6A51-4108-AA02-DFA0A04FC94B}">
-              <ma14:wrappingTextBoxFlag xmlns="" xmlns:m="http://schemas.openxmlformats.org/officeDocument/2006/math" xmlns:a14="http://schemas.microsoft.com/office/drawing/2010/main" xmlns:ma14="http://schemas.microsoft.com/office/mac/drawingml/2011/main" val="1"/>
+              <ma14:wrappingTextBoxFlag xmlns:ma14="http://schemas.microsoft.com/office/mac/drawingml/2011/main" xmlns:a14="http://schemas.microsoft.com/office/drawing/2010/main" xmlns:m="http://schemas.openxmlformats.org/officeDocument/2006/math" xmlns="" val="1"/>
             </a:ext>
           </a:extLst>
         </p:spPr>
@@ -3397,7 +3561,7 @@
           </a:ln>
           <a:extLst>
             <a:ext uri="{C572A759-6A51-4108-AA02-DFA0A04FC94B}">
-              <ma14:wrappingTextBoxFlag xmlns="" xmlns:m="http://schemas.openxmlformats.org/officeDocument/2006/math" xmlns:a14="http://schemas.microsoft.com/office/drawing/2010/main" xmlns:ma14="http://schemas.microsoft.com/office/mac/drawingml/2011/main" val="1"/>
+              <ma14:wrappingTextBoxFlag xmlns:ma14="http://schemas.microsoft.com/office/mac/drawingml/2011/main" xmlns:a14="http://schemas.microsoft.com/office/drawing/2010/main" xmlns:m="http://schemas.openxmlformats.org/officeDocument/2006/math" xmlns="" val="1"/>
             </a:ext>
           </a:extLst>
         </p:spPr>
@@ -4405,7 +4569,7 @@
           </a:ln>
           <a:extLst>
             <a:ext uri="{C572A759-6A51-4108-AA02-DFA0A04FC94B}">
-              <ma14:wrappingTextBoxFlag xmlns="" xmlns:m="http://schemas.openxmlformats.org/officeDocument/2006/math" xmlns:a14="http://schemas.microsoft.com/office/drawing/2010/main" xmlns:ma14="http://schemas.microsoft.com/office/mac/drawingml/2011/main" val="1"/>
+              <ma14:wrappingTextBoxFlag xmlns:ma14="http://schemas.microsoft.com/office/mac/drawingml/2011/main" xmlns:a14="http://schemas.microsoft.com/office/drawing/2010/main" xmlns:m="http://schemas.openxmlformats.org/officeDocument/2006/math" xmlns="" val="1"/>
             </a:ext>
           </a:extLst>
         </p:spPr>
@@ -4476,7 +4640,7 @@
           </a:ln>
           <a:extLst>
             <a:ext uri="{C572A759-6A51-4108-AA02-DFA0A04FC94B}">
-              <ma14:wrappingTextBoxFlag xmlns="" xmlns:m="http://schemas.openxmlformats.org/officeDocument/2006/math" xmlns:a14="http://schemas.microsoft.com/office/drawing/2010/main" xmlns:ma14="http://schemas.microsoft.com/office/mac/drawingml/2011/main" val="1"/>
+              <ma14:wrappingTextBoxFlag xmlns:ma14="http://schemas.microsoft.com/office/mac/drawingml/2011/main" xmlns:a14="http://schemas.microsoft.com/office/drawing/2010/main" xmlns:m="http://schemas.openxmlformats.org/officeDocument/2006/math" xmlns="" val="1"/>
             </a:ext>
           </a:extLst>
         </p:spPr>
@@ -7911,55 +8075,55 @@
           <a:lstStyle/>
           <a:p>
             <a:r>
-              <a:rPr lang="en-GB" sz="1600" dirty="0"/>
+              <a:rPr lang="en-GB" sz="1800" dirty="0"/>
               <a:t>A Health Equity Audit (HEA) is concerned with how fairly resources, opportunities, and access are distributed according to the needs of different groups.</a:t>
             </a:r>
           </a:p>
           <a:p>
             <a:r>
-              <a:rPr lang="en-GB" sz="1600" dirty="0"/>
+              <a:rPr lang="en-GB" sz="1800" dirty="0"/>
               <a:t>HEAs provide local evidence that can </a:t>
             </a:r>
             <a:r>
-              <a:rPr lang="en-GB" sz="1600" i="1" u="sng" dirty="0"/>
+              <a:rPr lang="en-GB" sz="1800" i="1" u="sng" dirty="0"/>
               <a:t>inform action</a:t>
             </a:r>
             <a:r>
-              <a:rPr lang="en-GB" sz="1600" dirty="0"/>
+              <a:rPr lang="en-GB" sz="1800" dirty="0"/>
               <a:t> to improve equity of access and outcomes.</a:t>
             </a:r>
           </a:p>
           <a:p>
             <a:r>
-              <a:rPr lang="en-GB" sz="1600" dirty="0"/>
+              <a:rPr lang="en-GB" sz="1800" dirty="0"/>
               <a:t>This may involve reviewing resource allocation to ensure services offered are </a:t>
             </a:r>
             <a:r>
-              <a:rPr lang="en-GB" sz="1600" i="1" u="sng" dirty="0"/>
+              <a:rPr lang="en-GB" sz="1800" i="1" u="sng" dirty="0"/>
               <a:t>proportionate to need </a:t>
             </a:r>
             <a:r>
-              <a:rPr lang="en-GB" sz="1600" dirty="0"/>
+              <a:rPr lang="en-GB" sz="1800" dirty="0"/>
               <a:t>across different geographical areas and population groups.</a:t>
             </a:r>
           </a:p>
           <a:p>
             <a:r>
-              <a:rPr lang="en-GB" sz="1600" dirty="0"/>
+              <a:rPr lang="en-GB" sz="1800" dirty="0"/>
               <a:t>They are intended to be </a:t>
             </a:r>
             <a:r>
-              <a:rPr lang="en-GB" sz="1600" i="1" u="sng" dirty="0"/>
+              <a:rPr lang="en-GB" sz="1800" i="1" u="sng" dirty="0"/>
               <a:t>refreshed regularly </a:t>
             </a:r>
             <a:r>
-              <a:rPr lang="en-GB" sz="1600" dirty="0"/>
+              <a:rPr lang="en-GB" sz="1800" dirty="0"/>
               <a:t>to assess the impact of actions and can support continuous improvement.</a:t>
             </a:r>
           </a:p>
           <a:p>
             <a:r>
-              <a:rPr lang="en-GB" sz="1600" dirty="0"/>
+              <a:rPr lang="en-GB" sz="1800" dirty="0"/>
               <a:t>Not a single product/report but a process</a:t>
             </a:r>
           </a:p>
@@ -8278,7 +8442,7 @@
           </a:ln>
           <a:extLst>
             <a:ext uri="{C572A759-6A51-4108-AA02-DFA0A04FC94B}">
-              <ma14:wrappingTextBoxFlag xmlns="" xmlns:m="http://schemas.openxmlformats.org/officeDocument/2006/math" xmlns:a14="http://schemas.microsoft.com/office/drawing/2010/main" xmlns:ma14="http://schemas.microsoft.com/office/mac/drawingml/2011/main" val="1"/>
+              <ma14:wrappingTextBoxFlag xmlns:ma14="http://schemas.microsoft.com/office/mac/drawingml/2011/main" xmlns:a14="http://schemas.microsoft.com/office/drawing/2010/main" xmlns:m="http://schemas.openxmlformats.org/officeDocument/2006/math" xmlns="" val="1"/>
             </a:ext>
           </a:extLst>
         </p:spPr>
@@ -8587,7 +8751,7 @@
           </a:ln>
           <a:extLst>
             <a:ext uri="{C572A759-6A51-4108-AA02-DFA0A04FC94B}">
-              <ma14:wrappingTextBoxFlag xmlns="" xmlns:m="http://schemas.openxmlformats.org/officeDocument/2006/math" xmlns:a14="http://schemas.microsoft.com/office/drawing/2010/main" xmlns:ma14="http://schemas.microsoft.com/office/mac/drawingml/2011/main" val="1"/>
+              <ma14:wrappingTextBoxFlag xmlns:ma14="http://schemas.microsoft.com/office/mac/drawingml/2011/main" xmlns:a14="http://schemas.microsoft.com/office/drawing/2010/main" xmlns:m="http://schemas.openxmlformats.org/officeDocument/2006/math" xmlns="" val="1"/>
             </a:ext>
           </a:extLst>
         </p:spPr>
@@ -9339,7 +9503,7 @@
             </a:extLst>
           </p:cNvPr>
           <p:cNvPicPr>
-            <a:picLocks noGrp="1" noRot="1" noChangeAspect="1" noMove="1" noResize="1" noEditPoints="1" noAdjustHandles="1" noChangeArrowheads="1" noChangeShapeType="1" noCrop="1"/>
+            <a:picLocks noChangeAspect="1"/>
           </p:cNvPicPr>
           <p:nvPr/>
         </p:nvPicPr>
@@ -9359,7 +9523,7 @@
         <p:spPr>
           <a:xfrm>
             <a:off x="647224" y="1011752"/>
-            <a:ext cx="9714210" cy="4077979"/>
+            <a:ext cx="8922991" cy="3745829"/>
           </a:xfrm>
           <a:prstGeom prst="rect">
             <a:avLst/>
@@ -9376,7 +9540,7 @@
             </a:extLst>
           </p:cNvPr>
           <p:cNvSpPr>
-            <a:spLocks/>
+            <a:spLocks noGrp="1"/>
           </p:cNvSpPr>
           <p:nvPr>
             <p:ph type="title"/>
@@ -9415,8 +9579,8 @@
         </p:nvSpPr>
         <p:spPr>
           <a:xfrm>
-            <a:off x="5788745" y="859007"/>
-            <a:ext cx="2954216" cy="1015661"/>
+            <a:off x="5644444" y="769222"/>
+            <a:ext cx="4655892" cy="1077216"/>
           </a:xfrm>
           <a:prstGeom prst="rect">
             <a:avLst/>
@@ -9448,7 +9612,7 @@
           <a:lstStyle/>
           <a:p>
             <a:r>
-              <a:rPr lang="en-GB" sz="1200" dirty="0"/>
+              <a:rPr lang="en-GB" sz="1600" dirty="0"/>
               <a:t>Second highest group accessing the early intervention service were those who were unemployed after managerial and professional groups.</a:t>
             </a:r>
           </a:p>
@@ -9469,7 +9633,7 @@
               <a:buNone/>
               <a:tabLst/>
             </a:pPr>
-            <a:endParaRPr kumimoji="0" lang="en-GB" sz="1200" b="0" i="0" u="none" strike="noStrike" cap="none" spc="0" normalizeH="0" baseline="0" dirty="0">
+            <a:endParaRPr kumimoji="0" lang="en-GB" sz="1600" b="0" i="0" u="none" strike="noStrike" cap="none" spc="0" normalizeH="0" baseline="0" dirty="0">
               <a:ln>
                 <a:noFill/>
               </a:ln>
@@ -9483,59 +9647,6 @@
               <a:cs typeface="Corbel"/>
               <a:sym typeface="Corbel"/>
             </a:endParaRPr>
-          </a:p>
-        </p:txBody>
-      </p:sp>
-      <p:sp>
-        <p:nvSpPr>
-          <p:cNvPr id="7" name="TextBox 6">
-            <a:extLst>
-              <a:ext uri="{FF2B5EF4-FFF2-40B4-BE49-F238E27FC236}">
-                <a16:creationId xmlns:a16="http://schemas.microsoft.com/office/drawing/2014/main" id="{C919DF72-385D-9569-14AE-E6AEA74BD526}"/>
-              </a:ext>
-            </a:extLst>
-          </p:cNvPr>
-          <p:cNvSpPr txBox="1"/>
-          <p:nvPr/>
-        </p:nvSpPr>
-        <p:spPr>
-          <a:xfrm>
-            <a:off x="8393508" y="1273786"/>
-            <a:ext cx="2692151" cy="461663"/>
-          </a:xfrm>
-          <a:prstGeom prst="rect">
-            <a:avLst/>
-          </a:prstGeom>
-          <a:noFill/>
-          <a:ln w="12700" cap="flat">
-            <a:noFill/>
-            <a:miter lim="400000"/>
-          </a:ln>
-          <a:effectLst/>
-          <a:sp3d/>
-        </p:spPr>
-        <p:style>
-          <a:lnRef idx="0">
-            <a:scrgbClr r="0" g="0" b="0"/>
-          </a:lnRef>
-          <a:fillRef idx="0">
-            <a:scrgbClr r="0" g="0" b="0"/>
-          </a:fillRef>
-          <a:effectRef idx="0">
-            <a:scrgbClr r="0" g="0" b="0"/>
-          </a:effectRef>
-          <a:fontRef idx="none"/>
-        </p:style>
-        <p:txBody>
-          <a:bodyPr rot="0" spcFirstLastPara="1" vertOverflow="overflow" horzOverflow="overflow" vert="horz" wrap="square" lIns="45719" tIns="45719" rIns="45719" bIns="45719" numCol="1" spcCol="38100" rtlCol="0" anchor="t">
-            <a:spAutoFit/>
-          </a:bodyPr>
-          <a:lstStyle/>
-          <a:p>
-            <a:r>
-              <a:rPr lang="en-GB" sz="1200" b="1" dirty="0"/>
-              <a:t>Data on deprivation not routinely collected in local services</a:t>
-            </a:r>
           </a:p>
         </p:txBody>
       </p:sp>
@@ -9554,7 +9665,7 @@
         <p:spPr>
           <a:xfrm>
             <a:off x="181364" y="1655402"/>
-            <a:ext cx="1986949" cy="1384993"/>
+            <a:ext cx="1986949" cy="2062101"/>
           </a:xfrm>
           <a:prstGeom prst="rect">
             <a:avLst/>
@@ -9586,7 +9697,7 @@
           <a:lstStyle/>
           <a:p>
             <a:r>
-              <a:rPr kumimoji="0" lang="en-GB" sz="1200" b="0" i="0" u="none" strike="noStrike" cap="none" spc="0" normalizeH="0" baseline="0" dirty="0">
+              <a:rPr kumimoji="0" lang="en-GB" sz="1600" b="0" i="0" u="none" strike="noStrike" cap="none" spc="0" normalizeH="0" baseline="0" dirty="0">
                 <a:ln>
                   <a:noFill/>
                 </a:ln>
@@ -9605,7 +9716,7 @@
           </a:p>
           <a:p>
             <a:r>
-              <a:rPr kumimoji="0" lang="en-GB" sz="1200" b="0" i="0" u="none" strike="noStrike" cap="none" spc="0" normalizeH="0" baseline="0" dirty="0">
+              <a:rPr kumimoji="0" lang="en-GB" sz="1600" b="0" i="0" u="none" strike="noStrike" cap="none" spc="0" normalizeH="0" baseline="0" dirty="0">
                 <a:ln>
                   <a:noFill/>
                 </a:ln>
@@ -9622,25 +9733,25 @@
               <a:t>in</a:t>
             </a:r>
             <a:r>
-              <a:rPr lang="en-GB" sz="1200" dirty="0"/>
+              <a:rPr lang="en-GB" sz="1600" dirty="0"/>
               <a:t>dicates lower </a:t>
             </a:r>
           </a:p>
           <a:p>
             <a:r>
-              <a:rPr lang="en-GB" sz="1200" dirty="0"/>
+              <a:rPr lang="en-GB" sz="1600" dirty="0"/>
               <a:t>consumption overall </a:t>
             </a:r>
           </a:p>
           <a:p>
             <a:r>
-              <a:rPr lang="en-GB" sz="1200" dirty="0"/>
+              <a:rPr lang="en-GB" sz="1600" dirty="0"/>
               <a:t>in less deprived areas.</a:t>
             </a:r>
           </a:p>
           <a:p>
             <a:r>
-              <a:rPr kumimoji="0" lang="en-GB" sz="1200" b="0" i="0" u="none" strike="noStrike" cap="none" spc="0" normalizeH="0" baseline="0" dirty="0">
+              <a:rPr kumimoji="0" lang="en-GB" sz="1600" b="0" i="0" u="none" strike="noStrike" cap="none" spc="0" normalizeH="0" baseline="0" dirty="0">
                 <a:ln>
                   <a:noFill/>
                 </a:ln>
@@ -9673,8 +9784,8 @@
         </p:nvSpPr>
         <p:spPr>
           <a:xfrm>
-            <a:off x="163623" y="3040395"/>
-            <a:ext cx="1986949" cy="830995"/>
+            <a:off x="178112" y="3717503"/>
+            <a:ext cx="3012662" cy="1077216"/>
           </a:xfrm>
           <a:prstGeom prst="rect">
             <a:avLst/>
@@ -9706,7 +9817,7 @@
           <a:lstStyle/>
           <a:p>
             <a:r>
-              <a:rPr kumimoji="0" lang="en-GB" sz="1200" b="0" i="0" u="none" strike="noStrike" cap="none" spc="0" normalizeH="0" baseline="0" dirty="0">
+              <a:rPr kumimoji="0" lang="en-GB" sz="1600" b="0" i="0" u="none" strike="noStrike" cap="none" spc="0" normalizeH="0" baseline="0" dirty="0">
                 <a:ln>
                   <a:noFill/>
                 </a:ln>
@@ -9739,8 +9850,8 @@
         </p:nvSpPr>
         <p:spPr>
           <a:xfrm>
-            <a:off x="4604250" y="859007"/>
-            <a:ext cx="1339889" cy="584773"/>
+            <a:off x="4222045" y="769222"/>
+            <a:ext cx="1339889" cy="646329"/>
           </a:xfrm>
           <a:prstGeom prst="rect">
             <a:avLst/>
@@ -9772,13 +9883,13 @@
           <a:lstStyle/>
           <a:p>
             <a:r>
-              <a:rPr lang="en-GB" sz="1600" b="1" dirty="0"/>
+              <a:rPr lang="en-GB" b="1" dirty="0"/>
               <a:t>Early </a:t>
             </a:r>
           </a:p>
           <a:p>
             <a:r>
-              <a:rPr lang="en-GB" sz="1600" b="1" dirty="0"/>
+              <a:rPr lang="en-GB" b="1" dirty="0"/>
               <a:t>intervention</a:t>
             </a:r>
           </a:p>
@@ -9798,8 +9909,8 @@
         </p:nvSpPr>
         <p:spPr>
           <a:xfrm>
-            <a:off x="181364" y="1026065"/>
-            <a:ext cx="3165231" cy="584773"/>
+            <a:off x="157837" y="787814"/>
+            <a:ext cx="3165231" cy="646329"/>
           </a:xfrm>
           <a:prstGeom prst="rect">
             <a:avLst/>
@@ -9831,13 +9942,13 @@
           <a:lstStyle/>
           <a:p>
             <a:r>
-              <a:rPr lang="en-GB" sz="1600" b="1" dirty="0"/>
+              <a:rPr lang="en-GB" b="1" dirty="0"/>
               <a:t>Alcohol </a:t>
             </a:r>
           </a:p>
           <a:p>
             <a:r>
-              <a:rPr lang="en-GB" sz="1600" b="1" dirty="0"/>
+              <a:rPr lang="en-GB" b="1" dirty="0"/>
               <a:t>consumption</a:t>
             </a:r>
           </a:p>
@@ -9857,8 +9968,8 @@
         </p:nvSpPr>
         <p:spPr>
           <a:xfrm>
-            <a:off x="5788745" y="2043918"/>
-            <a:ext cx="3165231" cy="584773"/>
+            <a:off x="5302681" y="1993524"/>
+            <a:ext cx="1081319" cy="646329"/>
           </a:xfrm>
           <a:prstGeom prst="rect">
             <a:avLst/>
@@ -9890,13 +10001,13 @@
           <a:lstStyle/>
           <a:p>
             <a:r>
-              <a:rPr lang="en-GB" sz="1600" b="1" dirty="0"/>
+              <a:rPr lang="en-GB" b="1" dirty="0"/>
               <a:t>Specialist </a:t>
             </a:r>
           </a:p>
           <a:p>
             <a:r>
-              <a:rPr lang="en-GB" sz="1600" b="1" dirty="0"/>
+              <a:rPr lang="en-GB" b="1" dirty="0"/>
               <a:t>services</a:t>
             </a:r>
           </a:p>
@@ -9916,8 +10027,8 @@
         </p:nvSpPr>
         <p:spPr>
           <a:xfrm>
-            <a:off x="6735185" y="2073579"/>
-            <a:ext cx="4244966" cy="646329"/>
+            <a:off x="6276889" y="1831858"/>
+            <a:ext cx="5068443" cy="830995"/>
           </a:xfrm>
           <a:prstGeom prst="rect">
             <a:avLst/>
@@ -9949,11 +10060,11 @@
           <a:lstStyle/>
           <a:p>
             <a:r>
-              <a:rPr lang="en-GB" sz="1200" dirty="0"/>
-              <a:t>Steep social gradient in caseload. </a:t>
-            </a:r>
-            <a:r>
-              <a:rPr kumimoji="0" lang="en-GB" sz="1200" b="0" i="0" u="none" strike="noStrike" cap="none" spc="0" normalizeH="0" baseline="0" dirty="0">
+              <a:rPr lang="en-GB" sz="1600" dirty="0"/>
+              <a:t>Steep social gradient in specialist service caseload. </a:t>
+            </a:r>
+            <a:r>
+              <a:rPr kumimoji="0" lang="en-GB" sz="1600" b="0" i="0" u="none" strike="noStrike" cap="none" spc="0" normalizeH="0" baseline="0" dirty="0">
                 <a:ln>
                   <a:noFill/>
                 </a:ln>
@@ -9970,11 +10081,11 @@
               <a:t>Indication of poorer outcomes in those in the most deprived </a:t>
             </a:r>
             <a:r>
-              <a:rPr lang="en-GB" sz="1200" dirty="0"/>
+              <a:rPr lang="en-GB" sz="1600" dirty="0"/>
               <a:t>areas </a:t>
             </a:r>
             <a:r>
-              <a:rPr kumimoji="0" lang="en-GB" sz="1200" b="0" i="0" u="none" strike="noStrike" cap="none" spc="0" normalizeH="0" baseline="0" dirty="0">
+              <a:rPr kumimoji="0" lang="en-GB" sz="1600" b="0" i="0" u="none" strike="noStrike" cap="none" spc="0" normalizeH="0" baseline="0" dirty="0">
                 <a:ln>
                   <a:noFill/>
                 </a:ln>
@@ -9988,7 +10099,7 @@
                 <a:cs typeface="Corbel"/>
                 <a:sym typeface="Corbel"/>
               </a:rPr>
-              <a:t>but not statistically significant difference.</a:t>
+              <a:t>but no statistically significant difference.</a:t>
             </a:r>
           </a:p>
         </p:txBody>
@@ -10007,8 +10118,8 @@
         </p:nvSpPr>
         <p:spPr>
           <a:xfrm>
-            <a:off x="7371360" y="2779832"/>
-            <a:ext cx="1686671" cy="1323437"/>
+            <a:off x="6838898" y="2725547"/>
+            <a:ext cx="1686671" cy="1477325"/>
           </a:xfrm>
           <a:prstGeom prst="rect">
             <a:avLst/>
@@ -10040,31 +10151,31 @@
           <a:lstStyle/>
           <a:p>
             <a:r>
-              <a:rPr lang="en-GB" sz="1600" b="1" dirty="0"/>
+              <a:rPr lang="en-GB" b="1" dirty="0"/>
               <a:t>Alcohol </a:t>
             </a:r>
           </a:p>
           <a:p>
             <a:r>
-              <a:rPr lang="en-GB" sz="1600" b="1" dirty="0"/>
+              <a:rPr lang="en-GB" b="1" dirty="0"/>
               <a:t>related A&amp;E </a:t>
             </a:r>
           </a:p>
           <a:p>
             <a:r>
-              <a:rPr lang="en-GB" sz="1600" b="1" dirty="0"/>
+              <a:rPr lang="en-GB" b="1" dirty="0"/>
               <a:t>attendances</a:t>
             </a:r>
           </a:p>
           <a:p>
             <a:r>
-              <a:rPr lang="en-GB" sz="1600" b="1" dirty="0"/>
+              <a:rPr lang="en-GB" b="1" dirty="0"/>
               <a:t>and hospital </a:t>
             </a:r>
           </a:p>
           <a:p>
             <a:r>
-              <a:rPr lang="en-GB" sz="1600" b="1" dirty="0"/>
+              <a:rPr lang="en-GB" b="1" dirty="0"/>
               <a:t>admissions</a:t>
             </a:r>
           </a:p>
@@ -10084,8 +10195,8 @@
         </p:nvSpPr>
         <p:spPr>
           <a:xfrm>
-            <a:off x="9001226" y="3517923"/>
-            <a:ext cx="3012662" cy="1015661"/>
+            <a:off x="8105422" y="3261889"/>
+            <a:ext cx="4261347" cy="1077216"/>
           </a:xfrm>
           <a:prstGeom prst="rect">
             <a:avLst/>
@@ -10117,7 +10228,7 @@
           <a:lstStyle/>
           <a:p>
             <a:r>
-              <a:rPr lang="en-GB" sz="1200" dirty="0"/>
+              <a:rPr lang="en-GB" sz="1600" dirty="0"/>
               <a:t>Greater number of admissions in more deprived deciles (deciles 2-4) than less deprived areas (deciles 6-9) but no clear gradient. Cause of admission varied by deprivation decile</a:t>
             </a:r>
           </a:p>
@@ -10137,8 +10248,8 @@
         </p:nvSpPr>
         <p:spPr>
           <a:xfrm>
-            <a:off x="9503043" y="4661526"/>
-            <a:ext cx="3165231" cy="338552"/>
+            <a:off x="8714468" y="4393335"/>
+            <a:ext cx="3165231" cy="646329"/>
           </a:xfrm>
           <a:prstGeom prst="rect">
             <a:avLst/>
@@ -10170,8 +10281,14 @@
           <a:lstStyle/>
           <a:p>
             <a:r>
-              <a:rPr lang="en-GB" sz="1600" b="1" dirty="0"/>
-              <a:t>Alcohol specific mortality</a:t>
+              <a:rPr lang="en-GB" b="1" dirty="0"/>
+              <a:t>Alcohol specific </a:t>
+            </a:r>
+          </a:p>
+          <a:p>
+            <a:r>
+              <a:rPr lang="en-GB" b="1" dirty="0"/>
+              <a:t>mortality</a:t>
             </a:r>
           </a:p>
         </p:txBody>
@@ -10190,8 +10307,8 @@
         </p:nvSpPr>
         <p:spPr>
           <a:xfrm>
-            <a:off x="9503043" y="4905175"/>
-            <a:ext cx="2954216" cy="1015661"/>
+            <a:off x="8717719" y="4925262"/>
+            <a:ext cx="3675101" cy="1077216"/>
           </a:xfrm>
           <a:prstGeom prst="rect">
             <a:avLst/>
@@ -10223,13 +10340,7 @@
           <a:lstStyle/>
           <a:p>
             <a:r>
-              <a:rPr lang="en-GB" sz="1200" dirty="0"/>
-              <a:t>Small numbers in local data.</a:t>
-            </a:r>
-          </a:p>
-          <a:p>
-            <a:r>
-              <a:rPr kumimoji="0" lang="en-GB" sz="1200" b="0" i="0" u="none" strike="noStrike" cap="none" spc="0" normalizeH="0" baseline="0" dirty="0">
+              <a:rPr kumimoji="0" lang="en-GB" sz="1600" b="0" i="0" u="none" strike="noStrike" cap="none" spc="0" normalizeH="0" baseline="0" dirty="0">
                 <a:ln>
                   <a:noFill/>
                 </a:ln>
@@ -10246,10 +10357,10 @@
               <a:t>Nationally there is a </a:t>
             </a:r>
             <a:r>
-              <a:rPr lang="en-GB" sz="1200" dirty="0"/>
+              <a:rPr lang="en-GB" sz="1600" dirty="0"/>
               <a:t>significantly higher alcohol specific rate of death in most deprived compared to least deprived neighbourhoods.</a:t>
             </a:r>
-            <a:endParaRPr kumimoji="0" lang="en-GB" sz="1200" b="0" i="0" u="none" strike="noStrike" cap="none" spc="0" normalizeH="0" baseline="0" dirty="0">
+            <a:endParaRPr kumimoji="0" lang="en-GB" sz="1600" b="0" i="0" u="none" strike="noStrike" cap="none" spc="0" normalizeH="0" baseline="0" dirty="0">
               <a:ln>
                 <a:noFill/>
               </a:ln>
@@ -10280,8 +10391,8 @@
         </p:nvSpPr>
         <p:spPr>
           <a:xfrm>
-            <a:off x="163623" y="3885179"/>
-            <a:ext cx="1633528" cy="584773"/>
+            <a:off x="197640" y="4841908"/>
+            <a:ext cx="1633528" cy="646329"/>
           </a:xfrm>
           <a:prstGeom prst="rect">
             <a:avLst/>
@@ -10313,7 +10424,7 @@
           <a:lstStyle/>
           <a:p>
             <a:r>
-              <a:rPr lang="en-GB" sz="1600" b="1" dirty="0">
+              <a:rPr lang="en-GB" b="1" dirty="0">
                 <a:solidFill>
                   <a:schemeClr val="tx1"/>
                 </a:solidFill>
@@ -10337,8 +10448,8 @@
         </p:nvSpPr>
         <p:spPr>
           <a:xfrm>
-            <a:off x="181364" y="4459733"/>
-            <a:ext cx="1741683" cy="830995"/>
+            <a:off x="1322439" y="4821740"/>
+            <a:ext cx="3012662" cy="830995"/>
           </a:xfrm>
           <a:prstGeom prst="rect">
             <a:avLst/>
@@ -10370,7 +10481,7 @@
           <a:lstStyle/>
           <a:p>
             <a:r>
-              <a:rPr kumimoji="0" lang="en-GB" sz="1200" b="0" i="0" u="none" strike="noStrike" cap="none" spc="0" normalizeH="0" baseline="0" dirty="0">
+              <a:rPr kumimoji="0" lang="en-GB" sz="1600" b="0" i="0" u="none" strike="noStrike" cap="none" spc="0" normalizeH="0" baseline="0" dirty="0">
                 <a:ln>
                   <a:noFill/>
                 </a:ln>
@@ -10403,8 +10514,8 @@
         </p:nvSpPr>
         <p:spPr>
           <a:xfrm>
-            <a:off x="9001226" y="2739476"/>
-            <a:ext cx="3213726" cy="830995"/>
+            <a:off x="8105422" y="2739476"/>
+            <a:ext cx="4109530" cy="584773"/>
           </a:xfrm>
           <a:prstGeom prst="rect">
             <a:avLst/>
@@ -10436,8 +10547,8 @@
           <a:lstStyle/>
           <a:p>
             <a:r>
-              <a:rPr lang="en-GB" sz="1200" dirty="0"/>
-              <a:t>Higher proportion of residents in most deprived areas with five or more attendances over the study period than those in least deprived neighbourhoods</a:t>
+              <a:rPr lang="en-GB" sz="1600" dirty="0"/>
+              <a:t>Higher proportion of residents in most deprived areas with five or more</a:t>
             </a:r>
           </a:p>
         </p:txBody>
@@ -12663,6 +12774,34 @@
 </file>
 
 <file path=customXml/item1.xml><?xml version="1.0" encoding="utf-8"?>
+<p:properties xmlns:p="http://schemas.microsoft.com/office/2006/metadata/properties" xmlns:xsi="http://www.w3.org/2001/XMLSchema-instance" xmlns:pc="http://schemas.microsoft.com/office/infopath/2007/PartnerControls">
+  <documentManagement>
+    <CSMeta2010Field xmlns="http://schemas.microsoft.com/sharepoint/v3">aa6b9718-9184-4441-bc24-f23478ffa8f5;2022-11-14 05:28:36;AUTOCLASSIFIED;WSCC Category:2022-11-14 05:28:36|False||AUTOCLASSIFIED|2022-11-14 05:28:36|UNDEFINED|00000000-0000-0000-0000-000000000000;False</CSMeta2010Field>
+    <j5da7913ca98450ab299b9b62231058f xmlns="1209568c-8f7e-4a25-939e-4f22fd0c2b25">
+      <Terms xmlns="http://schemas.microsoft.com/office/infopath/2007/PartnerControls">
+        <TermInfo xmlns="http://schemas.microsoft.com/office/infopath/2007/PartnerControls">
+          <TermName xmlns="http://schemas.microsoft.com/office/infopath/2007/PartnerControls">Business services:Management services:Corporate communication:Corporate branding</TermName>
+          <TermId xmlns="http://schemas.microsoft.com/office/infopath/2007/PartnerControls">85ef8696-1422-4dcb-af7a-a9ab7cc4ab69</TermId>
+        </TermInfo>
+      </Terms>
+    </j5da7913ca98450ab299b9b62231058f>
+    <TaxCatchAll xmlns="1209568c-8f7e-4a25-939e-4f22fd0c2b25">
+      <Value>1504</Value>
+    </TaxCatchAll>
+  </documentManagement>
+</p:properties>
+</file>
+
+<file path=customXml/item2.xml><?xml version="1.0" encoding="utf-8"?>
+<?mso-contentType ?>
+<FormTemplates xmlns="http://schemas.microsoft.com/sharepoint/v3/contenttype/forms">
+  <Display>DocumentLibraryForm</Display>
+  <Edit>DocumentLibraryForm</Edit>
+  <New>DocumentLibraryForm</New>
+</FormTemplates>
+</file>
+
+<file path=customXml/item3.xml><?xml version="1.0" encoding="utf-8"?>
 <?mso-contentType ?>
 <spe:Receivers xmlns:spe="http://schemas.microsoft.com/sharepoint/events">
   <Receiver>
@@ -12728,35 +12867,12 @@
 </spe:Receivers>
 </file>
 
-<file path=customXml/item2.xml><?xml version="1.0" encoding="utf-8"?>
+<file path=customXml/item4.xml><?xml version="1.0" encoding="utf-8"?>
 <?mso-contentType ?>
-<FormTemplates xmlns="http://schemas.microsoft.com/sharepoint/v3/contenttype/forms">
-  <Display>DocumentLibraryForm</Display>
-  <Edit>DocumentLibraryForm</Edit>
-  <New>DocumentLibraryForm</New>
-</FormTemplates>
+<SharedContentType xmlns="Microsoft.SharePoint.Taxonomy.ContentTypeSync" SourceId="73f0a195-02ac-4a72-b655-6664c0f36d60" ContentTypeId="0x01010008FB9B3217D433459C91B5CF793C1D79" PreviousValue="false"/>
 </file>
 
-<file path=customXml/item3.xml><?xml version="1.0" encoding="utf-8"?>
-<p:properties xmlns:p="http://schemas.microsoft.com/office/2006/metadata/properties" xmlns:xsi="http://www.w3.org/2001/XMLSchema-instance" xmlns:pc="http://schemas.microsoft.com/office/infopath/2007/PartnerControls">
-  <documentManagement>
-    <CSMeta2010Field xmlns="http://schemas.microsoft.com/sharepoint/v3">aa6b9718-9184-4441-bc24-f23478ffa8f5;2022-11-14 05:28:36;AUTOCLASSIFIED;WSCC Category:2022-11-14 05:28:36|False||AUTOCLASSIFIED|2022-11-14 05:28:36|UNDEFINED|00000000-0000-0000-0000-000000000000;False</CSMeta2010Field>
-    <j5da7913ca98450ab299b9b62231058f xmlns="1209568c-8f7e-4a25-939e-4f22fd0c2b25">
-      <Terms xmlns="http://schemas.microsoft.com/office/infopath/2007/PartnerControls">
-        <TermInfo xmlns="http://schemas.microsoft.com/office/infopath/2007/PartnerControls">
-          <TermName xmlns="http://schemas.microsoft.com/office/infopath/2007/PartnerControls">Business services:Management services:Corporate communication:Corporate branding</TermName>
-          <TermId xmlns="http://schemas.microsoft.com/office/infopath/2007/PartnerControls">85ef8696-1422-4dcb-af7a-a9ab7cc4ab69</TermId>
-        </TermInfo>
-      </Terms>
-    </j5da7913ca98450ab299b9b62231058f>
-    <TaxCatchAll xmlns="1209568c-8f7e-4a25-939e-4f22fd0c2b25">
-      <Value>1504</Value>
-    </TaxCatchAll>
-  </documentManagement>
-</p:properties>
-</file>
-
-<file path=customXml/item4.xml><?xml version="1.0" encoding="utf-8"?>
+<file path=customXml/item5.xml><?xml version="1.0" encoding="utf-8"?>
 <ct:contentTypeSchema xmlns:ct="http://schemas.microsoft.com/office/2006/metadata/contentType" xmlns:ma="http://schemas.microsoft.com/office/2006/metadata/properties/metaAttributes" ct:_="" ma:_="" ma:contentTypeName="WSCC Document" ma:contentTypeID="0x01010008FB9B3217D433459C91B5CF793C1D790031DEA77463AEA042BAB94F0060953925" ma:contentTypeVersion="3" ma:contentTypeDescription="" ma:contentTypeScope="" ma:versionID="1b283065b951049ec049c82abcaa26d5">
   <xsd:schema xmlns:xsd="http://www.w3.org/2001/XMLSchema" xmlns:xs="http://www.w3.org/2001/XMLSchema" xmlns:p="http://schemas.microsoft.com/office/2006/metadata/properties" xmlns:ns1="http://schemas.microsoft.com/sharepoint/v3" xmlns:ns2="1209568c-8f7e-4a25-939e-4f22fd0c2b25" targetNamespace="http://schemas.microsoft.com/office/2006/metadata/properties" ma:root="true" ma:fieldsID="7f8aec572b003ef88f2a3356b66bf8e0" ns1:_="" ns2:_="">
     <xsd:import namespace="http://schemas.microsoft.com/sharepoint/v3"/>
@@ -12919,28 +13035,7 @@
 </ct:contentTypeSchema>
 </file>
 
-<file path=customXml/item5.xml><?xml version="1.0" encoding="utf-8"?>
-<?mso-contentType ?>
-<SharedContentType xmlns="Microsoft.SharePoint.Taxonomy.ContentTypeSync" SourceId="73f0a195-02ac-4a72-b655-6664c0f36d60" ContentTypeId="0x01010008FB9B3217D433459C91B5CF793C1D79" PreviousValue="false"/>
-</file>
-
 <file path=customXml/itemProps1.xml><?xml version="1.0" encoding="utf-8"?>
-<ds:datastoreItem xmlns:ds="http://schemas.openxmlformats.org/officeDocument/2006/customXml" ds:itemID="{B11FCD1A-D034-431F-9D41-877EB493B83D}">
-  <ds:schemaRefs>
-    <ds:schemaRef ds:uri="http://schemas.microsoft.com/sharepoint/events"/>
-  </ds:schemaRefs>
-</ds:datastoreItem>
-</file>
-
-<file path=customXml/itemProps2.xml><?xml version="1.0" encoding="utf-8"?>
-<ds:datastoreItem xmlns:ds="http://schemas.openxmlformats.org/officeDocument/2006/customXml" ds:itemID="{CB037900-EBF6-4C03-AC2C-0AA466E11D03}">
-  <ds:schemaRefs>
-    <ds:schemaRef ds:uri="http://schemas.microsoft.com/sharepoint/v3/contenttype/forms"/>
-  </ds:schemaRefs>
-</ds:datastoreItem>
-</file>
-
-<file path=customXml/itemProps3.xml><?xml version="1.0" encoding="utf-8"?>
 <ds:datastoreItem xmlns:ds="http://schemas.openxmlformats.org/officeDocument/2006/customXml" ds:itemID="{6FF7C282-CF04-4D67-A92D-9DED042D778C}">
   <ds:schemaRefs>
     <ds:schemaRef ds:uri="http://purl.org/dc/elements/1.1/"/>
@@ -12957,7 +13052,31 @@
 </ds:datastoreItem>
 </file>
 
+<file path=customXml/itemProps2.xml><?xml version="1.0" encoding="utf-8"?>
+<ds:datastoreItem xmlns:ds="http://schemas.openxmlformats.org/officeDocument/2006/customXml" ds:itemID="{CB037900-EBF6-4C03-AC2C-0AA466E11D03}">
+  <ds:schemaRefs>
+    <ds:schemaRef ds:uri="http://schemas.microsoft.com/sharepoint/v3/contenttype/forms"/>
+  </ds:schemaRefs>
+</ds:datastoreItem>
+</file>
+
+<file path=customXml/itemProps3.xml><?xml version="1.0" encoding="utf-8"?>
+<ds:datastoreItem xmlns:ds="http://schemas.openxmlformats.org/officeDocument/2006/customXml" ds:itemID="{B11FCD1A-D034-431F-9D41-877EB493B83D}">
+  <ds:schemaRefs>
+    <ds:schemaRef ds:uri="http://schemas.microsoft.com/sharepoint/events"/>
+  </ds:schemaRefs>
+</ds:datastoreItem>
+</file>
+
 <file path=customXml/itemProps4.xml><?xml version="1.0" encoding="utf-8"?>
+<ds:datastoreItem xmlns:ds="http://schemas.openxmlformats.org/officeDocument/2006/customXml" ds:itemID="{74240134-B29B-4E98-B1ED-11113ED08676}">
+  <ds:schemaRefs>
+    <ds:schemaRef ds:uri="Microsoft.SharePoint.Taxonomy.ContentTypeSync"/>
+  </ds:schemaRefs>
+</ds:datastoreItem>
+</file>
+
+<file path=customXml/itemProps5.xml><?xml version="1.0" encoding="utf-8"?>
 <ds:datastoreItem xmlns:ds="http://schemas.openxmlformats.org/officeDocument/2006/customXml" ds:itemID="{EF15E34A-F682-49FD-8CD6-F876B41B6616}">
   <ds:schemaRefs>
     <ds:schemaRef ds:uri="http://schemas.microsoft.com/office/2006/metadata/contentType"/>
@@ -12974,12 +13093,4 @@
     <ds:schemaRef ds:uri="http://schemas.microsoft.com/internal/obd"/>
   </ds:schemaRefs>
 </ds:datastoreItem>
-</file>
-
-<file path=customXml/itemProps5.xml><?xml version="1.0" encoding="utf-8"?>
-<ds:datastoreItem xmlns:ds="http://schemas.openxmlformats.org/officeDocument/2006/customXml" ds:itemID="{74240134-B29B-4E98-B1ED-11113ED08676}">
-  <ds:schemaRefs>
-    <ds:schemaRef ds:uri="Microsoft.SharePoint.Taxonomy.ContentTypeSync"/>
-  </ds:schemaRefs>
-</ds:datastoreItem>
 </file>
</xml_diff>